<commit_message>
added PK in Sparkify Data Warehouse Schema slides
</commit_message>
<xml_diff>
--- a/01-data-modeling/03-data-modeling-with-postgres/ppt/SparkifyDataWarehouseSchema.pptx
+++ b/01-data-modeling/03-data-modeling-with-postgres/ppt/SparkifyDataWarehouseSchema.pptx
@@ -104,6 +104,11 @@
       </a:defRPr>
     </a:lvl9pPr>
   </p:defaultTextStyle>
+  <p:extLst>
+    <p:ext uri="{EFAFB233-063F-42B5-8137-9DF3F51BA10A}">
+      <p15:sldGuideLst xmlns:p15="http://schemas.microsoft.com/office/powerpoint/2012/main"/>
+    </p:ext>
+  </p:extLst>
 </p:presentation>
 </file>
 
@@ -256,7 +261,7 @@
           <a:p>
             <a:fld id="{2CD7BF15-ABB3-49BC-9C31-7B5EC14BCDDA}" type="datetimeFigureOut">
               <a:rPr lang="en-SG" smtClean="0"/>
-              <a:t>26/9/2021</a:t>
+              <a:t>2/10/2021</a:t>
             </a:fld>
             <a:endParaRPr lang="en-SG"/>
           </a:p>
@@ -456,7 +461,7 @@
           <a:p>
             <a:fld id="{2CD7BF15-ABB3-49BC-9C31-7B5EC14BCDDA}" type="datetimeFigureOut">
               <a:rPr lang="en-SG" smtClean="0"/>
-              <a:t>26/9/2021</a:t>
+              <a:t>2/10/2021</a:t>
             </a:fld>
             <a:endParaRPr lang="en-SG"/>
           </a:p>
@@ -666,7 +671,7 @@
           <a:p>
             <a:fld id="{2CD7BF15-ABB3-49BC-9C31-7B5EC14BCDDA}" type="datetimeFigureOut">
               <a:rPr lang="en-SG" smtClean="0"/>
-              <a:t>26/9/2021</a:t>
+              <a:t>2/10/2021</a:t>
             </a:fld>
             <a:endParaRPr lang="en-SG"/>
           </a:p>
@@ -866,7 +871,7 @@
           <a:p>
             <a:fld id="{2CD7BF15-ABB3-49BC-9C31-7B5EC14BCDDA}" type="datetimeFigureOut">
               <a:rPr lang="en-SG" smtClean="0"/>
-              <a:t>26/9/2021</a:t>
+              <a:t>2/10/2021</a:t>
             </a:fld>
             <a:endParaRPr lang="en-SG"/>
           </a:p>
@@ -1142,7 +1147,7 @@
           <a:p>
             <a:fld id="{2CD7BF15-ABB3-49BC-9C31-7B5EC14BCDDA}" type="datetimeFigureOut">
               <a:rPr lang="en-SG" smtClean="0"/>
-              <a:t>26/9/2021</a:t>
+              <a:t>2/10/2021</a:t>
             </a:fld>
             <a:endParaRPr lang="en-SG"/>
           </a:p>
@@ -1410,7 +1415,7 @@
           <a:p>
             <a:fld id="{2CD7BF15-ABB3-49BC-9C31-7B5EC14BCDDA}" type="datetimeFigureOut">
               <a:rPr lang="en-SG" smtClean="0"/>
-              <a:t>26/9/2021</a:t>
+              <a:t>2/10/2021</a:t>
             </a:fld>
             <a:endParaRPr lang="en-SG"/>
           </a:p>
@@ -1825,7 +1830,7 @@
           <a:p>
             <a:fld id="{2CD7BF15-ABB3-49BC-9C31-7B5EC14BCDDA}" type="datetimeFigureOut">
               <a:rPr lang="en-SG" smtClean="0"/>
-              <a:t>26/9/2021</a:t>
+              <a:t>2/10/2021</a:t>
             </a:fld>
             <a:endParaRPr lang="en-SG"/>
           </a:p>
@@ -1967,7 +1972,7 @@
           <a:p>
             <a:fld id="{2CD7BF15-ABB3-49BC-9C31-7B5EC14BCDDA}" type="datetimeFigureOut">
               <a:rPr lang="en-SG" smtClean="0"/>
-              <a:t>26/9/2021</a:t>
+              <a:t>2/10/2021</a:t>
             </a:fld>
             <a:endParaRPr lang="en-SG"/>
           </a:p>
@@ -2080,7 +2085,7 @@
           <a:p>
             <a:fld id="{2CD7BF15-ABB3-49BC-9C31-7B5EC14BCDDA}" type="datetimeFigureOut">
               <a:rPr lang="en-SG" smtClean="0"/>
-              <a:t>26/9/2021</a:t>
+              <a:t>2/10/2021</a:t>
             </a:fld>
             <a:endParaRPr lang="en-SG"/>
           </a:p>
@@ -2393,7 +2398,7 @@
           <a:p>
             <a:fld id="{2CD7BF15-ABB3-49BC-9C31-7B5EC14BCDDA}" type="datetimeFigureOut">
               <a:rPr lang="en-SG" smtClean="0"/>
-              <a:t>26/9/2021</a:t>
+              <a:t>2/10/2021</a:t>
             </a:fld>
             <a:endParaRPr lang="en-SG"/>
           </a:p>
@@ -2682,7 +2687,7 @@
           <a:p>
             <a:fld id="{2CD7BF15-ABB3-49BC-9C31-7B5EC14BCDDA}" type="datetimeFigureOut">
               <a:rPr lang="en-SG" smtClean="0"/>
-              <a:t>26/9/2021</a:t>
+              <a:t>2/10/2021</a:t>
             </a:fld>
             <a:endParaRPr lang="en-SG"/>
           </a:p>
@@ -2925,7 +2930,7 @@
           <a:p>
             <a:fld id="{2CD7BF15-ABB3-49BC-9C31-7B5EC14BCDDA}" type="datetimeFigureOut">
               <a:rPr lang="en-SG" smtClean="0"/>
-              <a:t>26/9/2021</a:t>
+              <a:t>2/10/2021</a:t>
             </a:fld>
             <a:endParaRPr lang="en-SG"/>
           </a:p>
@@ -3408,7 +3413,7 @@
         <p:spPr>
           <a:xfrm>
             <a:off x="4854816" y="809898"/>
-            <a:ext cx="5301890" cy="5242560"/>
+            <a:ext cx="5482258" cy="5242560"/>
           </a:xfrm>
           <a:prstGeom prst="rect">
             <a:avLst/>
@@ -3474,20 +3479,12 @@
           <a:p>
             <a:pPr algn="ctr"/>
             <a:r>
-              <a:rPr lang="en-SG" dirty="0" err="1">
+              <a:rPr lang="en-SG">
                 <a:solidFill>
                   <a:srgbClr val="0070C0"/>
                 </a:solidFill>
               </a:rPr>
-              <a:t>Sparkify</a:t>
-            </a:r>
-            <a:r>
-              <a:rPr lang="en-SG" dirty="0">
-                <a:solidFill>
-                  <a:srgbClr val="0070C0"/>
-                </a:solidFill>
-              </a:rPr>
-              <a:t> Data Warehouse</a:t>
+              <a:t>Sparkify Data Warehouse</a:t>
             </a:r>
           </a:p>
         </p:txBody>
@@ -3522,20 +3519,12 @@
           <a:p>
             <a:pPr algn="ctr"/>
             <a:r>
-              <a:rPr lang="en-SG" dirty="0" err="1">
+              <a:rPr lang="en-SG">
                 <a:solidFill>
                   <a:srgbClr val="0070C0"/>
                 </a:solidFill>
               </a:rPr>
-              <a:t>Sparkify</a:t>
-            </a:r>
-            <a:r>
-              <a:rPr lang="en-SG" dirty="0">
-                <a:solidFill>
-                  <a:srgbClr val="0070C0"/>
-                </a:solidFill>
-              </a:rPr>
-              <a:t> App Data</a:t>
+              <a:t>Sparkify App Data</a:t>
             </a:r>
           </a:p>
         </p:txBody>
@@ -3587,10 +3576,10 @@
                     <a:p>
                       <a:pPr algn="ctr"/>
                       <a:r>
-                        <a:rPr lang="en-SG" sz="1200" dirty="0" err="1"/>
+                        <a:rPr lang="en-SG" sz="1200" err="1"/>
                         <a:t>songplays</a:t>
                       </a:r>
-                      <a:endParaRPr lang="en-SG" sz="1200" dirty="0"/>
+                      <a:endParaRPr lang="en-SG" sz="1200"/>
                     </a:p>
                   </a:txBody>
                   <a:tcPr/>
@@ -3609,11 +3598,11 @@
                     <a:p>
                       <a:pPr algn="ctr"/>
                       <a:r>
-                        <a:rPr lang="en-SG" sz="1200" dirty="0" err="1"/>
+                        <a:rPr lang="en-SG" sz="1200" err="1"/>
                         <a:t>songplay_id</a:t>
                       </a:r>
                       <a:r>
-                        <a:rPr lang="en-SG" sz="1200" dirty="0"/>
+                        <a:rPr lang="en-SG" sz="1200"/>
                         <a:t> (PK)</a:t>
                       </a:r>
                     </a:p>
@@ -3634,11 +3623,11 @@
                     <a:p>
                       <a:pPr algn="ctr"/>
                       <a:r>
-                        <a:rPr lang="en-SG" sz="1200" dirty="0" err="1"/>
+                        <a:rPr lang="en-SG" sz="1200" err="1"/>
                         <a:t>start_time</a:t>
                       </a:r>
                       <a:r>
-                        <a:rPr lang="en-SG" sz="1200" dirty="0"/>
+                        <a:rPr lang="en-SG" sz="1200"/>
                         <a:t> (FK)</a:t>
                       </a:r>
                     </a:p>
@@ -3659,11 +3648,11 @@
                     <a:p>
                       <a:pPr algn="ctr"/>
                       <a:r>
-                        <a:rPr lang="en-SG" sz="1200" dirty="0" err="1"/>
+                        <a:rPr lang="en-SG" sz="1200" err="1"/>
                         <a:t>user_id</a:t>
                       </a:r>
                       <a:r>
-                        <a:rPr lang="en-SG" sz="1200" dirty="0"/>
+                        <a:rPr lang="en-SG" sz="1200"/>
                         <a:t> (FK)</a:t>
                       </a:r>
                     </a:p>
@@ -3684,7 +3673,7 @@
                     <a:p>
                       <a:pPr algn="ctr"/>
                       <a:r>
-                        <a:rPr lang="en-SG" sz="1200" dirty="0"/>
+                        <a:rPr lang="en-SG" sz="1200"/>
                         <a:t>level</a:t>
                       </a:r>
                     </a:p>
@@ -3705,11 +3694,11 @@
                     <a:p>
                       <a:pPr algn="ctr"/>
                       <a:r>
-                        <a:rPr lang="en-SG" sz="1200" dirty="0" err="1"/>
+                        <a:rPr lang="en-SG" sz="1200" err="1"/>
                         <a:t>song_id</a:t>
                       </a:r>
                       <a:r>
-                        <a:rPr lang="en-SG" sz="1200" dirty="0"/>
+                        <a:rPr lang="en-SG" sz="1200"/>
                         <a:t> (FK)</a:t>
                       </a:r>
                     </a:p>
@@ -3730,11 +3719,11 @@
                     <a:p>
                       <a:pPr algn="ctr"/>
                       <a:r>
-                        <a:rPr lang="en-SG" sz="1200" dirty="0" err="1"/>
+                        <a:rPr lang="en-SG" sz="1200" err="1"/>
                         <a:t>artist_id</a:t>
                       </a:r>
                       <a:r>
-                        <a:rPr lang="en-SG" sz="1200" dirty="0"/>
+                        <a:rPr lang="en-SG" sz="1200"/>
                         <a:t> (FK)</a:t>
                       </a:r>
                     </a:p>
@@ -3755,10 +3744,10 @@
                     <a:p>
                       <a:pPr algn="ctr"/>
                       <a:r>
-                        <a:rPr lang="en-SG" sz="1200" dirty="0" err="1"/>
+                        <a:rPr lang="en-SG" sz="1200" err="1"/>
                         <a:t>session_id</a:t>
                       </a:r>
-                      <a:endParaRPr lang="en-SG" sz="1200" dirty="0"/>
+                      <a:endParaRPr lang="en-SG" sz="1200"/>
                     </a:p>
                   </a:txBody>
                   <a:tcPr/>
@@ -3777,7 +3766,7 @@
                     <a:p>
                       <a:pPr algn="ctr"/>
                       <a:r>
-                        <a:rPr lang="en-SG" sz="1200" dirty="0"/>
+                        <a:rPr lang="en-SG" sz="1200"/>
                         <a:t>location</a:t>
                       </a:r>
                     </a:p>
@@ -3798,10 +3787,10 @@
                     <a:p>
                       <a:pPr algn="ctr"/>
                       <a:r>
-                        <a:rPr lang="en-SG" sz="1200" dirty="0" err="1"/>
+                        <a:rPr lang="en-SG" sz="1200" err="1"/>
                         <a:t>user_agent</a:t>
                       </a:r>
-                      <a:endParaRPr lang="en-SG" sz="1200" dirty="0"/>
+                      <a:endParaRPr lang="en-SG" sz="1200"/>
                     </a:p>
                   </a:txBody>
                   <a:tcPr/>
@@ -3831,7 +3820,7 @@
           <p:nvPr>
             <p:extLst>
               <p:ext uri="{D42A27DB-BD31-4B8C-83A1-F6EECF244321}">
-                <p14:modId xmlns:p14="http://schemas.microsoft.com/office/powerpoint/2010/main" val="858737413"/>
+                <p14:modId xmlns:p14="http://schemas.microsoft.com/office/powerpoint/2010/main" val="14612424"/>
               </p:ext>
             </p:extLst>
           </p:nvPr>
@@ -3863,7 +3852,7 @@
                     <a:p>
                       <a:pPr algn="ctr"/>
                       <a:r>
-                        <a:rPr lang="en-SG" sz="1200" dirty="0"/>
+                        <a:rPr lang="en-SG" sz="1200"/>
                         <a:t>users</a:t>
                       </a:r>
                     </a:p>
@@ -3884,10 +3873,9 @@
                     <a:p>
                       <a:pPr algn="ctr"/>
                       <a:r>
-                        <a:rPr lang="en-SG" sz="1200" dirty="0" err="1"/>
-                        <a:t>user_id</a:t>
+                        <a:rPr lang="en-SG" sz="1200"/>
+                        <a:t>user_id (PK)</a:t>
                       </a:r>
-                      <a:endParaRPr lang="en-SG" sz="1200" dirty="0"/>
                     </a:p>
                   </a:txBody>
                   <a:tcPr/>
@@ -3906,10 +3894,9 @@
                     <a:p>
                       <a:pPr algn="ctr"/>
                       <a:r>
-                        <a:rPr lang="en-SG" sz="1200" dirty="0" err="1"/>
+                        <a:rPr lang="en-SG" sz="1200"/>
                         <a:t>first_name</a:t>
                       </a:r>
-                      <a:endParaRPr lang="en-SG" sz="1200" dirty="0"/>
                     </a:p>
                   </a:txBody>
                   <a:tcPr/>
@@ -3928,10 +3915,10 @@
                     <a:p>
                       <a:pPr algn="ctr"/>
                       <a:r>
-                        <a:rPr lang="en-SG" sz="1200" dirty="0" err="1"/>
+                        <a:rPr lang="en-SG" sz="1200" err="1"/>
                         <a:t>last_name</a:t>
                       </a:r>
-                      <a:endParaRPr lang="en-SG" sz="1200" dirty="0"/>
+                      <a:endParaRPr lang="en-SG" sz="1200"/>
                     </a:p>
                   </a:txBody>
                   <a:tcPr/>
@@ -3950,7 +3937,7 @@
                     <a:p>
                       <a:pPr algn="ctr"/>
                       <a:r>
-                        <a:rPr lang="en-SG" sz="1200" dirty="0"/>
+                        <a:rPr lang="en-SG" sz="1200"/>
                         <a:t>gender</a:t>
                       </a:r>
                     </a:p>
@@ -3971,7 +3958,7 @@
                     <a:p>
                       <a:pPr algn="ctr"/>
                       <a:r>
-                        <a:rPr lang="en-SG" sz="1200" dirty="0"/>
+                        <a:rPr lang="en-SG" sz="1200"/>
                         <a:t>level</a:t>
                       </a:r>
                     </a:p>
@@ -4003,7 +3990,7 @@
           <p:nvPr>
             <p:extLst>
               <p:ext uri="{D42A27DB-BD31-4B8C-83A1-F6EECF244321}">
-                <p14:modId xmlns:p14="http://schemas.microsoft.com/office/powerpoint/2010/main" val="1608921754"/>
+                <p14:modId xmlns:p14="http://schemas.microsoft.com/office/powerpoint/2010/main" val="2094303125"/>
               </p:ext>
             </p:extLst>
           </p:nvPr>
@@ -4035,7 +4022,7 @@
                     <a:p>
                       <a:pPr algn="ctr"/>
                       <a:r>
-                        <a:rPr lang="en-SG" sz="1200" dirty="0"/>
+                        <a:rPr lang="en-SG" sz="1200"/>
                         <a:t>songs</a:t>
                       </a:r>
                     </a:p>
@@ -4056,10 +4043,13 @@
                     <a:p>
                       <a:pPr algn="ctr"/>
                       <a:r>
-                        <a:rPr lang="en-SG" sz="1200" dirty="0" err="1"/>
-                        <a:t>song_id</a:t>
+                        <a:rPr lang="en-SG" sz="1200" err="1"/>
+                        <a:t>song_</a:t>
                       </a:r>
-                      <a:endParaRPr lang="en-SG" sz="1200" dirty="0"/>
+                      <a:r>
+                        <a:rPr lang="en-SG" sz="1200"/>
+                        <a:t>id (PK)</a:t>
+                      </a:r>
                     </a:p>
                   </a:txBody>
                   <a:tcPr/>
@@ -4078,7 +4068,7 @@
                     <a:p>
                       <a:pPr algn="ctr"/>
                       <a:r>
-                        <a:rPr lang="en-SG" sz="1200" dirty="0"/>
+                        <a:rPr lang="en-SG" sz="1200"/>
                         <a:t>title</a:t>
                       </a:r>
                     </a:p>
@@ -4099,10 +4089,10 @@
                     <a:p>
                       <a:pPr algn="ctr"/>
                       <a:r>
-                        <a:rPr lang="en-SG" sz="1200" dirty="0" err="1"/>
+                        <a:rPr lang="en-SG" sz="1200" err="1"/>
                         <a:t>artist_id</a:t>
                       </a:r>
-                      <a:endParaRPr lang="en-SG" sz="1200" dirty="0"/>
+                      <a:endParaRPr lang="en-SG" sz="1200"/>
                     </a:p>
                   </a:txBody>
                   <a:tcPr/>
@@ -4121,7 +4111,7 @@
                     <a:p>
                       <a:pPr algn="ctr"/>
                       <a:r>
-                        <a:rPr lang="en-SG" sz="1200" dirty="0"/>
+                        <a:rPr lang="en-SG" sz="1200"/>
                         <a:t>year</a:t>
                       </a:r>
                     </a:p>
@@ -4142,7 +4132,7 @@
                     <a:p>
                       <a:pPr algn="ctr"/>
                       <a:r>
-                        <a:rPr lang="en-SG" sz="1200" dirty="0"/>
+                        <a:rPr lang="en-SG" sz="1200"/>
                         <a:t>duration</a:t>
                       </a:r>
                     </a:p>
@@ -4174,14 +4164,14 @@
           <p:nvPr>
             <p:extLst>
               <p:ext uri="{D42A27DB-BD31-4B8C-83A1-F6EECF244321}">
-                <p14:modId xmlns:p14="http://schemas.microsoft.com/office/powerpoint/2010/main" val="3089860365"/>
+                <p14:modId xmlns:p14="http://schemas.microsoft.com/office/powerpoint/2010/main" val="1705882338"/>
               </p:ext>
             </p:extLst>
           </p:nvPr>
         </p:nvGraphicFramePr>
         <p:xfrm>
           <a:off x="8875157" y="4056804"/>
-          <a:ext cx="1015999" cy="1645920"/>
+          <a:ext cx="1186559" cy="1645920"/>
         </p:xfrm>
         <a:graphic>
           <a:graphicData uri="http://schemas.openxmlformats.org/drawingml/2006/table">
@@ -4190,7 +4180,7 @@
                 <a:tableStyleId>{5C22544A-7EE6-4342-B048-85BDC9FD1C3A}</a:tableStyleId>
               </a:tblPr>
               <a:tblGrid>
-                <a:gridCol w="1015999">
+                <a:gridCol w="1186559">
                   <a:extLst>
                     <a:ext uri="{9D8B030D-6E8A-4147-A177-3AD203B41FA5}">
                       <a16:colId xmlns:a16="http://schemas.microsoft.com/office/drawing/2014/main" val="4139229275"/>
@@ -4206,7 +4196,7 @@
                     <a:p>
                       <a:pPr algn="ctr"/>
                       <a:r>
-                        <a:rPr lang="en-SG" sz="1200" dirty="0"/>
+                        <a:rPr lang="en-SG" sz="1200"/>
                         <a:t>artists</a:t>
                       </a:r>
                     </a:p>
@@ -4227,10 +4217,13 @@
                     <a:p>
                       <a:pPr algn="ctr"/>
                       <a:r>
-                        <a:rPr lang="en-SG" sz="1200" dirty="0" err="1"/>
-                        <a:t>artist_id</a:t>
+                        <a:rPr lang="en-SG" sz="1200" err="1"/>
+                        <a:t>artist_</a:t>
                       </a:r>
-                      <a:endParaRPr lang="en-SG" sz="1200" dirty="0"/>
+                      <a:r>
+                        <a:rPr lang="en-SG" sz="1200"/>
+                        <a:t>id (PK)</a:t>
+                      </a:r>
                     </a:p>
                   </a:txBody>
                   <a:tcPr/>
@@ -4249,7 +4242,7 @@
                     <a:p>
                       <a:pPr algn="ctr"/>
                       <a:r>
-                        <a:rPr lang="en-SG" sz="1200" dirty="0"/>
+                        <a:rPr lang="en-SG" sz="1200"/>
                         <a:t>name</a:t>
                       </a:r>
                     </a:p>
@@ -4270,7 +4263,7 @@
                     <a:p>
                       <a:pPr algn="ctr"/>
                       <a:r>
-                        <a:rPr lang="en-SG" sz="1200" dirty="0"/>
+                        <a:rPr lang="en-SG" sz="1200"/>
                         <a:t>location</a:t>
                       </a:r>
                     </a:p>
@@ -4291,7 +4284,7 @@
                     <a:p>
                       <a:pPr algn="ctr"/>
                       <a:r>
-                        <a:rPr lang="en-SG" sz="1200" dirty="0"/>
+                        <a:rPr lang="en-SG" sz="1200"/>
                         <a:t>latitude</a:t>
                       </a:r>
                     </a:p>
@@ -4312,7 +4305,7 @@
                     <a:p>
                       <a:pPr algn="ctr"/>
                       <a:r>
-                        <a:rPr lang="en-SG" sz="1200" dirty="0"/>
+                        <a:rPr lang="en-SG" sz="1200"/>
                         <a:t>longitude</a:t>
                       </a:r>
                     </a:p>
@@ -4344,14 +4337,14 @@
           <p:nvPr>
             <p:extLst>
               <p:ext uri="{D42A27DB-BD31-4B8C-83A1-F6EECF244321}">
-                <p14:modId xmlns:p14="http://schemas.microsoft.com/office/powerpoint/2010/main" val="3905819025"/>
+                <p14:modId xmlns:p14="http://schemas.microsoft.com/office/powerpoint/2010/main" val="1036911794"/>
               </p:ext>
             </p:extLst>
           </p:nvPr>
         </p:nvGraphicFramePr>
         <p:xfrm>
           <a:off x="8875158" y="1760265"/>
-          <a:ext cx="1015999" cy="2194560"/>
+          <a:ext cx="1186559" cy="2194560"/>
         </p:xfrm>
         <a:graphic>
           <a:graphicData uri="http://schemas.openxmlformats.org/drawingml/2006/table">
@@ -4360,7 +4353,7 @@
                 <a:tableStyleId>{5C22544A-7EE6-4342-B048-85BDC9FD1C3A}</a:tableStyleId>
               </a:tblPr>
               <a:tblGrid>
-                <a:gridCol w="1015999">
+                <a:gridCol w="1186559">
                   <a:extLst>
                     <a:ext uri="{9D8B030D-6E8A-4147-A177-3AD203B41FA5}">
                       <a16:colId xmlns:a16="http://schemas.microsoft.com/office/drawing/2014/main" val="4139229275"/>
@@ -4376,7 +4369,7 @@
                     <a:p>
                       <a:pPr algn="ctr"/>
                       <a:r>
-                        <a:rPr lang="en-SG" sz="1200" dirty="0"/>
+                        <a:rPr lang="en-SG" sz="1200"/>
                         <a:t>time</a:t>
                       </a:r>
                     </a:p>
@@ -4397,10 +4390,13 @@
                     <a:p>
                       <a:pPr algn="ctr"/>
                       <a:r>
-                        <a:rPr lang="en-SG" sz="1200" dirty="0" err="1"/>
-                        <a:t>start_time</a:t>
+                        <a:rPr lang="en-SG" sz="1200" err="1"/>
+                        <a:t>start_</a:t>
                       </a:r>
-                      <a:endParaRPr lang="en-SG" sz="1200" dirty="0"/>
+                      <a:r>
+                        <a:rPr lang="en-SG" sz="1200"/>
+                        <a:t>time (PK)</a:t>
+                      </a:r>
                     </a:p>
                   </a:txBody>
                   <a:tcPr/>
@@ -4419,7 +4415,7 @@
                     <a:p>
                       <a:pPr algn="ctr"/>
                       <a:r>
-                        <a:rPr lang="en-SG" sz="1200" dirty="0"/>
+                        <a:rPr lang="en-SG" sz="1200"/>
                         <a:t>hour</a:t>
                       </a:r>
                     </a:p>
@@ -4440,7 +4436,7 @@
                     <a:p>
                       <a:pPr algn="ctr"/>
                       <a:r>
-                        <a:rPr lang="en-SG" sz="1200" dirty="0"/>
+                        <a:rPr lang="en-SG" sz="1200"/>
                         <a:t>day</a:t>
                       </a:r>
                     </a:p>
@@ -4461,7 +4457,7 @@
                     <a:p>
                       <a:pPr algn="ctr"/>
                       <a:r>
-                        <a:rPr lang="en-SG" sz="1200" dirty="0"/>
+                        <a:rPr lang="en-SG" sz="1200"/>
                         <a:t>week</a:t>
                       </a:r>
                     </a:p>
@@ -4482,7 +4478,7 @@
                     <a:p>
                       <a:pPr algn="ctr"/>
                       <a:r>
-                        <a:rPr lang="en-SG" sz="1200" dirty="0"/>
+                        <a:rPr lang="en-SG" sz="1200"/>
                         <a:t>month</a:t>
                       </a:r>
                     </a:p>
@@ -4503,7 +4499,7 @@
                     <a:p>
                       <a:pPr algn="ctr"/>
                       <a:r>
-                        <a:rPr lang="en-SG" sz="1200" dirty="0"/>
+                        <a:rPr lang="en-SG" sz="1200"/>
                         <a:t>year</a:t>
                       </a:r>
                     </a:p>
@@ -4524,7 +4520,7 @@
                     <a:p>
                       <a:pPr algn="ctr"/>
                       <a:r>
-                        <a:rPr lang="en-SG" sz="1200" dirty="0"/>
+                        <a:rPr lang="en-SG" sz="1200"/>
                         <a:t>weekday</a:t>
                       </a:r>
                     </a:p>
@@ -4784,7 +4780,7 @@
             <a:p>
               <a:pPr algn="ctr"/>
               <a:r>
-                <a:rPr lang="en-SG" sz="1200" dirty="0"/>
+                <a:rPr lang="en-SG" sz="1200"/>
                 <a:t>User-Activity Log Data</a:t>
               </a:r>
             </a:p>
@@ -4820,7 +4816,7 @@
             <a:p>
               <a:pPr algn="ctr"/>
               <a:r>
-                <a:rPr lang="en-SG" sz="1200" dirty="0"/>
+                <a:rPr lang="en-SG" sz="1200"/>
                 <a:t>JSON</a:t>
               </a:r>
             </a:p>
@@ -4877,7 +4873,7 @@
             <a:p>
               <a:pPr algn="ctr"/>
               <a:r>
-                <a:rPr lang="en-SG" sz="1200" dirty="0"/>
+                <a:rPr lang="en-SG" sz="1200"/>
                 <a:t>Song Data</a:t>
               </a:r>
             </a:p>
@@ -4913,7 +4909,7 @@
             <a:p>
               <a:pPr algn="ctr"/>
               <a:r>
-                <a:rPr lang="en-SG" sz="1200" dirty="0"/>
+                <a:rPr lang="en-SG" sz="1200"/>
                 <a:t>JSON</a:t>
               </a:r>
             </a:p>
@@ -5195,6 +5191,78 @@
           <a:p>
             <a:pPr algn="ctr"/>
             <a:endParaRPr lang="en-SG"/>
+          </a:p>
+        </p:txBody>
+      </p:sp>
+      <p:sp>
+        <p:nvSpPr>
+          <p:cNvPr id="52" name="TextBox 51">
+            <a:extLst>
+              <a:ext uri="{FF2B5EF4-FFF2-40B4-BE49-F238E27FC236}">
+                <a16:creationId xmlns:a16="http://schemas.microsoft.com/office/drawing/2014/main" id="{059640C1-45A9-49F6-8F5C-6762334356B0}"/>
+              </a:ext>
+            </a:extLst>
+          </p:cNvPr>
+          <p:cNvSpPr txBox="1"/>
+          <p:nvPr/>
+        </p:nvSpPr>
+        <p:spPr>
+          <a:xfrm>
+            <a:off x="3864805" y="2582840"/>
+            <a:ext cx="673661" cy="246221"/>
+          </a:xfrm>
+          <a:prstGeom prst="rect">
+            <a:avLst/>
+          </a:prstGeom>
+          <a:noFill/>
+        </p:spPr>
+        <p:txBody>
+          <a:bodyPr wrap="square" rtlCol="0">
+            <a:spAutoFit/>
+          </a:bodyPr>
+          <a:lstStyle/>
+          <a:p>
+            <a:pPr algn="ctr"/>
+            <a:r>
+              <a:rPr lang="en-SG" sz="1000"/>
+              <a:t>Integrate</a:t>
+            </a:r>
+          </a:p>
+        </p:txBody>
+      </p:sp>
+      <p:sp>
+        <p:nvSpPr>
+          <p:cNvPr id="53" name="TextBox 52">
+            <a:extLst>
+              <a:ext uri="{FF2B5EF4-FFF2-40B4-BE49-F238E27FC236}">
+                <a16:creationId xmlns:a16="http://schemas.microsoft.com/office/drawing/2014/main" id="{AF4A5C63-14F7-4520-AED6-D42875E873CD}"/>
+              </a:ext>
+            </a:extLst>
+          </p:cNvPr>
+          <p:cNvSpPr txBox="1"/>
+          <p:nvPr/>
+        </p:nvSpPr>
+        <p:spPr>
+          <a:xfrm>
+            <a:off x="3843773" y="4477228"/>
+            <a:ext cx="673661" cy="246221"/>
+          </a:xfrm>
+          <a:prstGeom prst="rect">
+            <a:avLst/>
+          </a:prstGeom>
+          <a:noFill/>
+        </p:spPr>
+        <p:txBody>
+          <a:bodyPr wrap="square" rtlCol="0">
+            <a:spAutoFit/>
+          </a:bodyPr>
+          <a:lstStyle/>
+          <a:p>
+            <a:pPr algn="ctr"/>
+            <a:r>
+              <a:rPr lang="en-SG" sz="1000"/>
+              <a:t>Integrate</a:t>
+            </a:r>
           </a:p>
         </p:txBody>
       </p:sp>

</xml_diff>